<commit_message>
Remove Michelin logo from generic architecture runway poster
</commit_message>
<xml_diff>
--- a/Assets/4.Practices/KIT GENERIC RUNWAY-2020.2.1.0.pptx
+++ b/Assets/4.Practices/KIT GENERIC RUNWAY-2020.2.1.0.pptx
@@ -264,7 +264,7 @@
           <a:p>
             <a:fld id="{9BFAC1C7-9E5D-4441-A8DE-D4FA72AEF22D}" type="datetimeFigureOut">
               <a:rPr lang="fr-FR" smtClean="0"/>
-              <a:t>21/10/2020</a:t>
+              <a:t>12/07/2024</a:t>
             </a:fld>
             <a:endParaRPr lang="fr-FR"/>
           </a:p>
@@ -330,7 +330,7 @@
           <a:p>
             <a:fld id="{3549939F-CAB9-FE40-8FD3-31C143F5FB1D}" type="slidenum">
               <a:rPr lang="fr-FR" smtClean="0"/>
-              <a:t>‹N°›</a:t>
+              <a:t>‹#›</a:t>
             </a:fld>
             <a:endParaRPr lang="fr-FR"/>
           </a:p>
@@ -430,7 +430,7 @@
           <a:p>
             <a:fld id="{6D15EC3C-BFA7-9E4C-BB13-BAA5658834CA}" type="datetimeFigureOut">
               <a:rPr lang="fr-FR" smtClean="0"/>
-              <a:t>21/10/2020</a:t>
+              <a:t>12/07/2024</a:t>
             </a:fld>
             <a:endParaRPr lang="fr-FR"/>
           </a:p>
@@ -588,7 +588,7 @@
           <a:p>
             <a:fld id="{5DEDB5E3-C477-CC4C-8674-BAC7A0562584}" type="slidenum">
               <a:rPr lang="fr-FR" smtClean="0"/>
-              <a:t>‹N°›</a:t>
+              <a:t>‹#›</a:t>
             </a:fld>
             <a:endParaRPr lang="fr-FR"/>
           </a:p>
@@ -1609,7 +1609,7 @@
             <a:fld id="{8373236F-A915-0744-BEC1-6CC85BABB131}" type="slidenum">
               <a:rPr lang="fr-FR" smtClean="0"/>
               <a:pPr/>
-              <a:t>‹N°›</a:t>
+              <a:t>‹#›</a:t>
             </a:fld>
             <a:endParaRPr lang="fr-FR"/>
           </a:p>
@@ -1834,7 +1834,7 @@
             <a:fld id="{8373236F-A915-0744-BEC1-6CC85BABB131}" type="slidenum">
               <a:rPr lang="fr-FR" smtClean="0"/>
               <a:pPr/>
-              <a:t>‹N°›</a:t>
+              <a:t>‹#›</a:t>
             </a:fld>
             <a:endParaRPr lang="fr-FR"/>
           </a:p>
@@ -2066,7 +2066,7 @@
             <a:fld id="{8373236F-A915-0744-BEC1-6CC85BABB131}" type="slidenum">
               <a:rPr lang="fr-FR" smtClean="0"/>
               <a:pPr/>
-              <a:t>‹N°›</a:t>
+              <a:t>‹#›</a:t>
             </a:fld>
             <a:endParaRPr lang="fr-FR"/>
           </a:p>
@@ -2317,7 +2317,7 @@
             <a:fld id="{8373236F-A915-0744-BEC1-6CC85BABB131}" type="slidenum">
               <a:rPr lang="fr-FR" smtClean="0"/>
               <a:pPr/>
-              <a:t>‹N°›</a:t>
+              <a:t>‹#›</a:t>
             </a:fld>
             <a:endParaRPr lang="fr-FR"/>
           </a:p>
@@ -2540,7 +2540,7 @@
             <a:fld id="{8373236F-A915-0744-BEC1-6CC85BABB131}" type="slidenum">
               <a:rPr lang="fr-FR" smtClean="0"/>
               <a:pPr/>
-              <a:t>‹N°›</a:t>
+              <a:t>‹#›</a:t>
             </a:fld>
             <a:endParaRPr lang="fr-FR"/>
           </a:p>
@@ -2710,7 +2710,7 @@
             <a:fld id="{8373236F-A915-0744-BEC1-6CC85BABB131}" type="slidenum">
               <a:rPr lang="fr-FR" smtClean="0"/>
               <a:pPr/>
-              <a:t>‹N°›</a:t>
+              <a:t>‹#›</a:t>
             </a:fld>
             <a:endParaRPr lang="fr-FR"/>
           </a:p>
@@ -2917,7 +2917,7 @@
             <a:fld id="{8373236F-A915-0744-BEC1-6CC85BABB131}" type="slidenum">
               <a:rPr lang="fr-FR" smtClean="0"/>
               <a:pPr/>
-              <a:t>‹N°›</a:t>
+              <a:t>‹#›</a:t>
             </a:fld>
             <a:endParaRPr lang="fr-FR"/>
           </a:p>
@@ -2961,7 +2961,7 @@
           </p:cNvGraphicFramePr>
           <p:nvPr>
             <p:custDataLst>
-              <p:tags r:id="rId2"/>
+              <p:tags r:id="rId1"/>
             </p:custDataLst>
             <p:extLst>
               <p:ext uri="{D42A27DB-BD31-4B8C-83A1-F6EECF244321}">
@@ -2978,12 +2978,12 @@
           <a:graphicData uri="http://schemas.openxmlformats.org/presentationml/2006/ole">
             <mc:AlternateContent xmlns:mc="http://schemas.openxmlformats.org/markup-compatibility/2006">
               <mc:Choice xmlns:v="urn:schemas-microsoft-com:vml" Requires="v">
-                <p:oleObj spid="_x0000_s3075" name="Diapositive think-cell" r:id="rId4" imgW="270" imgH="270" progId="TCLayout.ActiveDocument.1">
+                <p:oleObj name="Diapositive think-cell" r:id="rId3" imgW="270" imgH="270" progId="TCLayout.ActiveDocument.1">
                   <p:embed/>
                 </p:oleObj>
               </mc:Choice>
               <mc:Fallback>
-                <p:oleObj name="Diapositive think-cell" r:id="rId4" imgW="270" imgH="270" progId="TCLayout.ActiveDocument.1">
+                <p:oleObj name="Diapositive think-cell" r:id="rId3" imgW="270" imgH="270" progId="TCLayout.ActiveDocument.1">
                   <p:embed/>
                   <p:pic>
                     <p:nvPicPr>
@@ -2992,7 +2992,7 @@
                       <p:nvPr/>
                     </p:nvPicPr>
                     <p:blipFill>
-                      <a:blip r:embed="rId5"/>
+                      <a:blip r:embed="rId4"/>
                       <a:stretch>
                         <a:fillRect/>
                       </a:stretch>
@@ -3157,7 +3157,7 @@
             <a:fld id="{8373236F-A915-0744-BEC1-6CC85BABB131}" type="slidenum">
               <a:rPr lang="fr-FR" smtClean="0"/>
               <a:pPr/>
-              <a:t>‹N°›</a:t>
+              <a:t>‹#›</a:t>
             </a:fld>
             <a:endParaRPr lang="fr-FR"/>
           </a:p>
@@ -3208,7 +3208,7 @@
           <p:nvPr/>
         </p:nvPicPr>
         <p:blipFill>
-          <a:blip r:embed="rId6">
+          <a:blip r:embed="rId5">
             <a:extLst>
               <a:ext uri="{28A0092B-C50C-407E-A947-70E740481C1C}">
                 <a14:useLocalDpi xmlns:a14="http://schemas.microsoft.com/office/drawing/2010/main"/>
@@ -3692,7 +3692,7 @@
             <a:fld id="{8373236F-A915-0744-BEC1-6CC85BABB131}" type="slidenum">
               <a:rPr lang="fr-FR" smtClean="0"/>
               <a:pPr/>
-              <a:t>‹N°›</a:t>
+              <a:t>‹#›</a:t>
             </a:fld>
             <a:endParaRPr lang="fr-FR"/>
           </a:p>
@@ -3990,7 +3990,7 @@
             <a:fld id="{8373236F-A915-0744-BEC1-6CC85BABB131}" type="slidenum">
               <a:rPr lang="fr-FR" smtClean="0"/>
               <a:pPr/>
-              <a:t>‹N°›</a:t>
+              <a:t>‹#›</a:t>
             </a:fld>
             <a:endParaRPr lang="fr-FR"/>
           </a:p>
@@ -4434,7 +4434,7 @@
             <a:fld id="{8373236F-A915-0744-BEC1-6CC85BABB131}" type="slidenum">
               <a:rPr lang="fr-FR" smtClean="0"/>
               <a:pPr/>
-              <a:t>‹N°›</a:t>
+              <a:t>‹#›</a:t>
             </a:fld>
             <a:endParaRPr lang="fr-FR"/>
           </a:p>
@@ -5119,7 +5119,7 @@
               <a:pPr>
                 <a:defRPr/>
               </a:pPr>
-              <a:t>21/10/2020</a:t>
+              <a:t>12/07/2024</a:t>
             </a:fld>
             <a:endParaRPr lang="fr-FR"/>
           </a:p>
@@ -5190,7 +5190,7 @@
               <a:pPr>
                 <a:defRPr/>
               </a:pPr>
-              <a:t>‹N°›</a:t>
+              <a:t>‹#›</a:t>
             </a:fld>
             <a:endParaRPr lang="fr-FR"/>
           </a:p>
@@ -5331,7 +5331,7 @@
             <a:fld id="{8373236F-A915-0744-BEC1-6CC85BABB131}" type="slidenum">
               <a:rPr lang="fr-FR" smtClean="0"/>
               <a:pPr/>
-              <a:t>‹N°›</a:t>
+              <a:t>‹#›</a:t>
             </a:fld>
             <a:endParaRPr lang="fr-FR"/>
           </a:p>
@@ -5492,7 +5492,7 @@
             <a:fld id="{8373236F-A915-0744-BEC1-6CC85BABB131}" type="slidenum">
               <a:rPr lang="fr-FR" smtClean="0"/>
               <a:pPr/>
-              <a:t>‹N°›</a:t>
+              <a:t>‹#›</a:t>
             </a:fld>
             <a:endParaRPr lang="fr-FR"/>
           </a:p>
@@ -5683,7 +5683,7 @@
             <a:fld id="{8373236F-A915-0744-BEC1-6CC85BABB131}" type="slidenum">
               <a:rPr lang="fr-FR" smtClean="0"/>
               <a:pPr/>
-              <a:t>‹N°›</a:t>
+              <a:t>‹#›</a:t>
             </a:fld>
             <a:endParaRPr lang="fr-FR"/>
           </a:p>
@@ -5757,7 +5757,7 @@
           </p:cNvGraphicFramePr>
           <p:nvPr userDrawn="1">
             <p:custDataLst>
-              <p:tags r:id="rId2"/>
+              <p:tags r:id="rId1"/>
             </p:custDataLst>
             <p:extLst>
               <p:ext uri="{D42A27DB-BD31-4B8C-83A1-F6EECF244321}">
@@ -5774,12 +5774,12 @@
           <a:graphicData uri="http://schemas.openxmlformats.org/presentationml/2006/ole">
             <mc:AlternateContent xmlns:mc="http://schemas.openxmlformats.org/markup-compatibility/2006">
               <mc:Choice xmlns:v="urn:schemas-microsoft-com:vml" Requires="v">
-                <p:oleObj spid="_x0000_s5123" name="Diapositive think-cell" r:id="rId4" imgW="270" imgH="270" progId="TCLayout.ActiveDocument.1">
+                <p:oleObj name="Diapositive think-cell" r:id="rId3" imgW="270" imgH="270" progId="TCLayout.ActiveDocument.1">
                   <p:embed/>
                 </p:oleObj>
               </mc:Choice>
               <mc:Fallback>
-                <p:oleObj name="Diapositive think-cell" r:id="rId4" imgW="270" imgH="270" progId="TCLayout.ActiveDocument.1">
+                <p:oleObj name="Diapositive think-cell" r:id="rId3" imgW="270" imgH="270" progId="TCLayout.ActiveDocument.1">
                   <p:embed/>
                   <p:pic>
                     <p:nvPicPr>
@@ -5788,7 +5788,7 @@
                       <p:nvPr/>
                     </p:nvPicPr>
                     <p:blipFill>
-                      <a:blip r:embed="rId5"/>
+                      <a:blip r:embed="rId4"/>
                       <a:stretch>
                         <a:fillRect/>
                       </a:stretch>
@@ -5953,7 +5953,7 @@
             <a:fld id="{8373236F-A915-0744-BEC1-6CC85BABB131}" type="slidenum">
               <a:rPr lang="fr-FR" smtClean="0"/>
               <a:pPr/>
-              <a:t>‹N°›</a:t>
+              <a:t>‹#›</a:t>
             </a:fld>
             <a:endParaRPr lang="fr-FR"/>
           </a:p>
@@ -6004,7 +6004,7 @@
           <p:nvPr userDrawn="1"/>
         </p:nvPicPr>
         <p:blipFill>
-          <a:blip r:embed="rId6">
+          <a:blip r:embed="rId5">
             <a:extLst>
               <a:ext uri="{28A0092B-C50C-407E-A947-70E740481C1C}">
                 <a14:useLocalDpi xmlns:a14="http://schemas.microsoft.com/office/drawing/2010/main"/>
@@ -6488,7 +6488,7 @@
             <a:fld id="{8373236F-A915-0744-BEC1-6CC85BABB131}" type="slidenum">
               <a:rPr lang="fr-FR" smtClean="0"/>
               <a:pPr/>
-              <a:t>‹N°›</a:t>
+              <a:t>‹#›</a:t>
             </a:fld>
             <a:endParaRPr lang="fr-FR"/>
           </a:p>
@@ -6786,7 +6786,7 @@
             <a:fld id="{8373236F-A915-0744-BEC1-6CC85BABB131}" type="slidenum">
               <a:rPr lang="fr-FR" smtClean="0"/>
               <a:pPr/>
-              <a:t>‹N°›</a:t>
+              <a:t>‹#›</a:t>
             </a:fld>
             <a:endParaRPr lang="fr-FR"/>
           </a:p>
@@ -7070,7 +7070,7 @@
           </p:cNvGraphicFramePr>
           <p:nvPr>
             <p:custDataLst>
-              <p:tags r:id="rId2"/>
+              <p:tags r:id="rId1"/>
             </p:custDataLst>
             <p:extLst>
               <p:ext uri="{D42A27DB-BD31-4B8C-83A1-F6EECF244321}">
@@ -7087,12 +7087,12 @@
           <a:graphicData uri="http://schemas.openxmlformats.org/presentationml/2006/ole">
             <mc:AlternateContent xmlns:mc="http://schemas.openxmlformats.org/markup-compatibility/2006">
               <mc:Choice xmlns:v="urn:schemas-microsoft-com:vml" Requires="v">
-                <p:oleObj spid="_x0000_s7171" name="Diapositive think-cell" r:id="rId4" imgW="270" imgH="270" progId="TCLayout.ActiveDocument.1">
+                <p:oleObj name="Diapositive think-cell" r:id="rId3" imgW="270" imgH="270" progId="TCLayout.ActiveDocument.1">
                   <p:embed/>
                 </p:oleObj>
               </mc:Choice>
               <mc:Fallback>
-                <p:oleObj name="Diapositive think-cell" r:id="rId4" imgW="270" imgH="270" progId="TCLayout.ActiveDocument.1">
+                <p:oleObj name="Diapositive think-cell" r:id="rId3" imgW="270" imgH="270" progId="TCLayout.ActiveDocument.1">
                   <p:embed/>
                   <p:pic>
                     <p:nvPicPr>
@@ -7101,7 +7101,7 @@
                       <p:nvPr/>
                     </p:nvPicPr>
                     <p:blipFill>
-                      <a:blip r:embed="rId5"/>
+                      <a:blip r:embed="rId4"/>
                       <a:stretch>
                         <a:fillRect/>
                       </a:stretch>
@@ -7266,7 +7266,7 @@
             <a:fld id="{8373236F-A915-0744-BEC1-6CC85BABB131}" type="slidenum">
               <a:rPr lang="fr-FR" smtClean="0"/>
               <a:pPr/>
-              <a:t>‹N°›</a:t>
+              <a:t>‹#›</a:t>
             </a:fld>
             <a:endParaRPr lang="fr-FR"/>
           </a:p>
@@ -7317,7 +7317,7 @@
           <p:nvPr/>
         </p:nvPicPr>
         <p:blipFill>
-          <a:blip r:embed="rId6">
+          <a:blip r:embed="rId5">
             <a:extLst>
               <a:ext uri="{28A0092B-C50C-407E-A947-70E740481C1C}">
                 <a14:useLocalDpi xmlns:a14="http://schemas.microsoft.com/office/drawing/2010/main"/>
@@ -7801,7 +7801,7 @@
             <a:fld id="{8373236F-A915-0744-BEC1-6CC85BABB131}" type="slidenum">
               <a:rPr lang="fr-FR" smtClean="0"/>
               <a:pPr/>
-              <a:t>‹N°›</a:t>
+              <a:t>‹#›</a:t>
             </a:fld>
             <a:endParaRPr lang="fr-FR"/>
           </a:p>
@@ -8099,7 +8099,7 @@
             <a:fld id="{8373236F-A915-0744-BEC1-6CC85BABB131}" type="slidenum">
               <a:rPr lang="fr-FR" smtClean="0"/>
               <a:pPr/>
-              <a:t>‹N°›</a:t>
+              <a:t>‹#›</a:t>
             </a:fld>
             <a:endParaRPr lang="fr-FR"/>
           </a:p>
@@ -8519,7 +8519,7 @@
             <a:fld id="{8373236F-A915-0744-BEC1-6CC85BABB131}" type="slidenum">
               <a:rPr lang="fr-FR" smtClean="0"/>
               <a:pPr/>
-              <a:t>‹N°›</a:t>
+              <a:t>‹#›</a:t>
             </a:fld>
             <a:endParaRPr lang="fr-FR"/>
           </a:p>
@@ -9575,7 +9575,7 @@
                 <a:buNone/>
                 <a:tabLst/>
               </a:pPr>
-              <a:t>‹N°›</a:t>
+              <a:t>‹#›</a:t>
             </a:fld>
             <a:endParaRPr kumimoji="0" lang="en-US" sz="840" u="none" strike="noStrike" kern="1200" cap="none" normalizeH="0" baseline="0">
               <a:ln>
@@ -9633,7 +9633,7 @@
           </p:cNvGraphicFramePr>
           <p:nvPr>
             <p:custDataLst>
-              <p:tags r:id="rId2"/>
+              <p:tags r:id="rId1"/>
             </p:custDataLst>
           </p:nvPr>
         </p:nvGraphicFramePr>
@@ -9645,12 +9645,12 @@
           <a:graphicData uri="http://schemas.openxmlformats.org/presentationml/2006/ole">
             <mc:AlternateContent xmlns:mc="http://schemas.openxmlformats.org/markup-compatibility/2006">
               <mc:Choice xmlns:v="urn:schemas-microsoft-com:vml" Requires="v">
-                <p:oleObj spid="_x0000_s9219" name="Diapositive think-cell" r:id="rId4" imgW="270" imgH="270" progId="TCLayout.ActiveDocument.1">
+                <p:oleObj name="Diapositive think-cell" r:id="rId3" imgW="270" imgH="270" progId="TCLayout.ActiveDocument.1">
                   <p:embed/>
                 </p:oleObj>
               </mc:Choice>
               <mc:Fallback>
-                <p:oleObj name="Diapositive think-cell" r:id="rId4" imgW="270" imgH="270" progId="TCLayout.ActiveDocument.1">
+                <p:oleObj name="Diapositive think-cell" r:id="rId3" imgW="270" imgH="270" progId="TCLayout.ActiveDocument.1">
                   <p:embed/>
                   <p:pic>
                     <p:nvPicPr>
@@ -9659,7 +9659,7 @@
                       <p:nvPr/>
                     </p:nvPicPr>
                     <p:blipFill>
-                      <a:blip r:embed="rId5"/>
+                      <a:blip r:embed="rId4"/>
                       <a:stretch>
                         <a:fillRect/>
                       </a:stretch>
@@ -9824,7 +9824,7 @@
             <a:fld id="{8373236F-A915-0744-BEC1-6CC85BABB131}" type="slidenum">
               <a:rPr lang="fr-FR" smtClean="0"/>
               <a:pPr/>
-              <a:t>‹N°›</a:t>
+              <a:t>‹#›</a:t>
             </a:fld>
             <a:endParaRPr lang="fr-FR"/>
           </a:p>
@@ -9875,7 +9875,7 @@
           <p:nvPr/>
         </p:nvPicPr>
         <p:blipFill>
-          <a:blip r:embed="rId6">
+          <a:blip r:embed="rId5">
             <a:extLst>
               <a:ext uri="{28A0092B-C50C-407E-A947-70E740481C1C}">
                 <a14:useLocalDpi xmlns:a14="http://schemas.microsoft.com/office/drawing/2010/main"/>
@@ -10359,7 +10359,7 @@
             <a:fld id="{8373236F-A915-0744-BEC1-6CC85BABB131}" type="slidenum">
               <a:rPr lang="fr-FR" smtClean="0"/>
               <a:pPr/>
-              <a:t>‹N°›</a:t>
+              <a:t>‹#›</a:t>
             </a:fld>
             <a:endParaRPr lang="fr-FR"/>
           </a:p>
@@ -10657,7 +10657,7 @@
             <a:fld id="{8373236F-A915-0744-BEC1-6CC85BABB131}" type="slidenum">
               <a:rPr lang="fr-FR" smtClean="0"/>
               <a:pPr/>
-              <a:t>‹N°›</a:t>
+              <a:t>‹#›</a:t>
             </a:fld>
             <a:endParaRPr lang="fr-FR"/>
           </a:p>
@@ -11401,7 +11401,7 @@
                 <a:buNone/>
                 <a:tabLst/>
               </a:pPr>
-              <a:t>‹N°›</a:t>
+              <a:t>‹#›</a:t>
             </a:fld>
             <a:endParaRPr kumimoji="0" lang="en-US" sz="840" u="none" strike="noStrike" kern="1200" cap="none" normalizeH="0" baseline="0">
               <a:ln>
@@ -11459,7 +11459,7 @@
           </p:cNvGraphicFramePr>
           <p:nvPr userDrawn="1">
             <p:custDataLst>
-              <p:tags r:id="rId2"/>
+              <p:tags r:id="rId1"/>
             </p:custDataLst>
           </p:nvPr>
         </p:nvGraphicFramePr>
@@ -11471,12 +11471,12 @@
           <a:graphicData uri="http://schemas.openxmlformats.org/presentationml/2006/ole">
             <mc:AlternateContent xmlns:mc="http://schemas.openxmlformats.org/markup-compatibility/2006">
               <mc:Choice xmlns:v="urn:schemas-microsoft-com:vml" Requires="v">
-                <p:oleObj spid="_x0000_s11267" name="Diapositive think-cell" r:id="rId4" imgW="270" imgH="270" progId="TCLayout.ActiveDocument.1">
+                <p:oleObj name="Diapositive think-cell" r:id="rId3" imgW="270" imgH="270" progId="TCLayout.ActiveDocument.1">
                   <p:embed/>
                 </p:oleObj>
               </mc:Choice>
               <mc:Fallback>
-                <p:oleObj name="Diapositive think-cell" r:id="rId4" imgW="270" imgH="270" progId="TCLayout.ActiveDocument.1">
+                <p:oleObj name="Diapositive think-cell" r:id="rId3" imgW="270" imgH="270" progId="TCLayout.ActiveDocument.1">
                   <p:embed/>
                   <p:pic>
                     <p:nvPicPr>
@@ -11485,7 +11485,7 @@
                       <p:nvPr/>
                     </p:nvPicPr>
                     <p:blipFill>
-                      <a:blip r:embed="rId5"/>
+                      <a:blip r:embed="rId4"/>
                       <a:stretch>
                         <a:fillRect/>
                       </a:stretch>
@@ -11650,7 +11650,7 @@
             <a:fld id="{8373236F-A915-0744-BEC1-6CC85BABB131}" type="slidenum">
               <a:rPr lang="fr-FR" smtClean="0"/>
               <a:pPr/>
-              <a:t>‹N°›</a:t>
+              <a:t>‹#›</a:t>
             </a:fld>
             <a:endParaRPr lang="fr-FR"/>
           </a:p>
@@ -11701,7 +11701,7 @@
           <p:nvPr userDrawn="1"/>
         </p:nvPicPr>
         <p:blipFill>
-          <a:blip r:embed="rId6">
+          <a:blip r:embed="rId5">
             <a:extLst>
               <a:ext uri="{28A0092B-C50C-407E-A947-70E740481C1C}">
                 <a14:useLocalDpi xmlns:a14="http://schemas.microsoft.com/office/drawing/2010/main"/>
@@ -12185,7 +12185,7 @@
             <a:fld id="{8373236F-A915-0744-BEC1-6CC85BABB131}" type="slidenum">
               <a:rPr lang="fr-FR" smtClean="0"/>
               <a:pPr/>
-              <a:t>‹N°›</a:t>
+              <a:t>‹#›</a:t>
             </a:fld>
             <a:endParaRPr lang="fr-FR"/>
           </a:p>
@@ -12483,7 +12483,7 @@
             <a:fld id="{8373236F-A915-0744-BEC1-6CC85BABB131}" type="slidenum">
               <a:rPr lang="fr-FR" smtClean="0"/>
               <a:pPr/>
-              <a:t>‹N°›</a:t>
+              <a:t>‹#›</a:t>
             </a:fld>
             <a:endParaRPr lang="fr-FR"/>
           </a:p>
@@ -12792,7 +12792,7 @@
               <a:pPr>
                 <a:defRPr/>
               </a:pPr>
-              <a:t>21/10/2020</a:t>
+              <a:t>12/07/2024</a:t>
             </a:fld>
             <a:endParaRPr lang="fr-FR"/>
           </a:p>
@@ -12863,7 +12863,7 @@
               <a:pPr>
                 <a:defRPr/>
               </a:pPr>
-              <a:t>‹N°›</a:t>
+              <a:t>‹#›</a:t>
             </a:fld>
             <a:endParaRPr lang="fr-FR"/>
           </a:p>
@@ -13013,7 +13013,7 @@
             <a:fld id="{8373236F-A915-0744-BEC1-6CC85BABB131}" type="slidenum">
               <a:rPr lang="fr-FR" smtClean="0"/>
               <a:pPr/>
-              <a:t>‹N°›</a:t>
+              <a:t>‹#›</a:t>
             </a:fld>
             <a:endParaRPr lang="fr-FR"/>
           </a:p>
@@ -13758,7 +13758,7 @@
             <a:fld id="{8373236F-A915-0744-BEC1-6CC85BABB131}" type="slidenum">
               <a:rPr lang="fr-FR" smtClean="0"/>
               <a:pPr/>
-              <a:t>‹N°›</a:t>
+              <a:t>‹#›</a:t>
             </a:fld>
             <a:endParaRPr lang="fr-FR"/>
           </a:p>
@@ -14503,7 +14503,7 @@
             <a:fld id="{8373236F-A915-0744-BEC1-6CC85BABB131}" type="slidenum">
               <a:rPr lang="fr-FR" smtClean="0"/>
               <a:pPr/>
-              <a:t>‹N°›</a:t>
+              <a:t>‹#›</a:t>
             </a:fld>
             <a:endParaRPr lang="fr-FR"/>
           </a:p>
@@ -15278,7 +15278,7 @@
             <a:fld id="{8373236F-A915-0744-BEC1-6CC85BABB131}" type="slidenum">
               <a:rPr lang="fr-FR" smtClean="0"/>
               <a:pPr/>
-              <a:t>‹N°›</a:t>
+              <a:t>‹#›</a:t>
             </a:fld>
             <a:endParaRPr lang="fr-FR"/>
           </a:p>
@@ -16115,7 +16115,7 @@
             <a:fld id="{8373236F-A915-0744-BEC1-6CC85BABB131}" type="slidenum">
               <a:rPr lang="fr-FR" smtClean="0"/>
               <a:pPr/>
-              <a:t>‹N°›</a:t>
+              <a:t>‹#›</a:t>
             </a:fld>
             <a:endParaRPr lang="fr-FR"/>
           </a:p>
@@ -16228,7 +16228,7 @@
           </p:cNvGraphicFramePr>
           <p:nvPr userDrawn="1">
             <p:custDataLst>
-              <p:tags r:id="rId11"/>
+              <p:tags r:id="rId10"/>
             </p:custDataLst>
             <p:extLst>
               <p:ext uri="{D42A27DB-BD31-4B8C-83A1-F6EECF244321}">
@@ -16245,12 +16245,12 @@
           <a:graphicData uri="http://schemas.openxmlformats.org/presentationml/2006/ole">
             <mc:AlternateContent xmlns:mc="http://schemas.openxmlformats.org/markup-compatibility/2006">
               <mc:Choice xmlns:v="urn:schemas-microsoft-com:vml" Requires="v">
-                <p:oleObj spid="_x0000_s1027" name="Diapositive think-cell" r:id="rId12" imgW="270" imgH="270" progId="TCLayout.ActiveDocument.1">
+                <p:oleObj name="Diapositive think-cell" r:id="rId11" imgW="270" imgH="270" progId="TCLayout.ActiveDocument.1">
                   <p:embed/>
                 </p:oleObj>
               </mc:Choice>
               <mc:Fallback>
-                <p:oleObj name="Diapositive think-cell" r:id="rId12" imgW="270" imgH="270" progId="TCLayout.ActiveDocument.1">
+                <p:oleObj name="Diapositive think-cell" r:id="rId11" imgW="270" imgH="270" progId="TCLayout.ActiveDocument.1">
                   <p:embed/>
                   <p:pic>
                     <p:nvPicPr>
@@ -16259,7 +16259,7 @@
                       <p:nvPr/>
                     </p:nvPicPr>
                     <p:blipFill>
-                      <a:blip r:embed="rId13"/>
+                      <a:blip r:embed="rId12"/>
                       <a:stretch>
                         <a:fillRect/>
                       </a:stretch>
@@ -16875,7 +16875,7 @@
           </p:cNvGraphicFramePr>
           <p:nvPr>
             <p:custDataLst>
-              <p:tags r:id="rId8"/>
+              <p:tags r:id="rId7"/>
             </p:custDataLst>
             <p:extLst>
               <p:ext uri="{D42A27DB-BD31-4B8C-83A1-F6EECF244321}">
@@ -16892,12 +16892,12 @@
           <a:graphicData uri="http://schemas.openxmlformats.org/presentationml/2006/ole">
             <mc:AlternateContent xmlns:mc="http://schemas.openxmlformats.org/markup-compatibility/2006">
               <mc:Choice xmlns:v="urn:schemas-microsoft-com:vml" Requires="v">
-                <p:oleObj spid="_x0000_s2051" name="Diapositive think-cell" r:id="rId9" imgW="270" imgH="270" progId="TCLayout.ActiveDocument.1">
+                <p:oleObj name="Diapositive think-cell" r:id="rId8" imgW="270" imgH="270" progId="TCLayout.ActiveDocument.1">
                   <p:embed/>
                 </p:oleObj>
               </mc:Choice>
               <mc:Fallback>
-                <p:oleObj name="Diapositive think-cell" r:id="rId9" imgW="270" imgH="270" progId="TCLayout.ActiveDocument.1">
+                <p:oleObj name="Diapositive think-cell" r:id="rId8" imgW="270" imgH="270" progId="TCLayout.ActiveDocument.1">
                   <p:embed/>
                   <p:pic>
                     <p:nvPicPr>
@@ -16906,7 +16906,7 @@
                       <p:nvPr/>
                     </p:nvPicPr>
                     <p:blipFill>
-                      <a:blip r:embed="rId10"/>
+                      <a:blip r:embed="rId9"/>
                       <a:stretch>
                         <a:fillRect/>
                       </a:stretch>
@@ -17514,7 +17514,7 @@
           </p:cNvGraphicFramePr>
           <p:nvPr userDrawn="1">
             <p:custDataLst>
-              <p:tags r:id="rId6"/>
+              <p:tags r:id="rId5"/>
             </p:custDataLst>
             <p:extLst>
               <p:ext uri="{D42A27DB-BD31-4B8C-83A1-F6EECF244321}">
@@ -17531,12 +17531,12 @@
           <a:graphicData uri="http://schemas.openxmlformats.org/presentationml/2006/ole">
             <mc:AlternateContent xmlns:mc="http://schemas.openxmlformats.org/markup-compatibility/2006">
               <mc:Choice xmlns:v="urn:schemas-microsoft-com:vml" Requires="v">
-                <p:oleObj spid="_x0000_s4099" name="Diapositive think-cell" r:id="rId7" imgW="270" imgH="270" progId="TCLayout.ActiveDocument.1">
+                <p:oleObj name="Diapositive think-cell" r:id="rId6" imgW="270" imgH="270" progId="TCLayout.ActiveDocument.1">
                   <p:embed/>
                 </p:oleObj>
               </mc:Choice>
               <mc:Fallback>
-                <p:oleObj name="Diapositive think-cell" r:id="rId7" imgW="270" imgH="270" progId="TCLayout.ActiveDocument.1">
+                <p:oleObj name="Diapositive think-cell" r:id="rId6" imgW="270" imgH="270" progId="TCLayout.ActiveDocument.1">
                   <p:embed/>
                   <p:pic>
                     <p:nvPicPr>
@@ -17545,7 +17545,7 @@
                       <p:nvPr/>
                     </p:nvPicPr>
                     <p:blipFill>
-                      <a:blip r:embed="rId8"/>
+                      <a:blip r:embed="rId7"/>
                       <a:stretch>
                         <a:fillRect/>
                       </a:stretch>
@@ -17862,7 +17862,7 @@
           </p:cNvGraphicFramePr>
           <p:nvPr>
             <p:custDataLst>
-              <p:tags r:id="rId7"/>
+              <p:tags r:id="rId6"/>
             </p:custDataLst>
             <p:extLst>
               <p:ext uri="{D42A27DB-BD31-4B8C-83A1-F6EECF244321}">
@@ -17879,12 +17879,12 @@
           <a:graphicData uri="http://schemas.openxmlformats.org/presentationml/2006/ole">
             <mc:AlternateContent xmlns:mc="http://schemas.openxmlformats.org/markup-compatibility/2006">
               <mc:Choice xmlns:v="urn:schemas-microsoft-com:vml" Requires="v">
-                <p:oleObj spid="_x0000_s6147" name="Diapositive think-cell" r:id="rId8" imgW="270" imgH="270" progId="TCLayout.ActiveDocument.1">
+                <p:oleObj name="Diapositive think-cell" r:id="rId7" imgW="270" imgH="270" progId="TCLayout.ActiveDocument.1">
                   <p:embed/>
                 </p:oleObj>
               </mc:Choice>
               <mc:Fallback>
-                <p:oleObj name="Diapositive think-cell" r:id="rId8" imgW="270" imgH="270" progId="TCLayout.ActiveDocument.1">
+                <p:oleObj name="Diapositive think-cell" r:id="rId7" imgW="270" imgH="270" progId="TCLayout.ActiveDocument.1">
                   <p:embed/>
                   <p:pic>
                     <p:nvPicPr>
@@ -17893,7 +17893,7 @@
                       <p:nvPr/>
                     </p:nvPicPr>
                     <p:blipFill>
-                      <a:blip r:embed="rId9"/>
+                      <a:blip r:embed="rId8"/>
                       <a:stretch>
                         <a:fillRect/>
                       </a:stretch>
@@ -18211,7 +18211,7 @@
           </p:cNvGraphicFramePr>
           <p:nvPr>
             <p:custDataLst>
-              <p:tags r:id="rId7"/>
+              <p:tags r:id="rId6"/>
             </p:custDataLst>
           </p:nvPr>
         </p:nvGraphicFramePr>
@@ -18223,12 +18223,12 @@
           <a:graphicData uri="http://schemas.openxmlformats.org/presentationml/2006/ole">
             <mc:AlternateContent xmlns:mc="http://schemas.openxmlformats.org/markup-compatibility/2006">
               <mc:Choice xmlns:v="urn:schemas-microsoft-com:vml" Requires="v">
-                <p:oleObj spid="_x0000_s8195" name="Diapositive think-cell" r:id="rId8" imgW="270" imgH="270" progId="TCLayout.ActiveDocument.1">
+                <p:oleObj name="Diapositive think-cell" r:id="rId7" imgW="270" imgH="270" progId="TCLayout.ActiveDocument.1">
                   <p:embed/>
                 </p:oleObj>
               </mc:Choice>
               <mc:Fallback>
-                <p:oleObj name="Diapositive think-cell" r:id="rId8" imgW="270" imgH="270" progId="TCLayout.ActiveDocument.1">
+                <p:oleObj name="Diapositive think-cell" r:id="rId7" imgW="270" imgH="270" progId="TCLayout.ActiveDocument.1">
                   <p:embed/>
                   <p:pic>
                     <p:nvPicPr>
@@ -18237,7 +18237,7 @@
                       <p:nvPr/>
                     </p:nvPicPr>
                     <p:blipFill>
-                      <a:blip r:embed="rId9"/>
+                      <a:blip r:embed="rId8"/>
                       <a:stretch>
                         <a:fillRect/>
                       </a:stretch>
@@ -18555,7 +18555,7 @@
           </p:cNvGraphicFramePr>
           <p:nvPr userDrawn="1">
             <p:custDataLst>
-              <p:tags r:id="rId7"/>
+              <p:tags r:id="rId6"/>
             </p:custDataLst>
           </p:nvPr>
         </p:nvGraphicFramePr>
@@ -18567,12 +18567,12 @@
           <a:graphicData uri="http://schemas.openxmlformats.org/presentationml/2006/ole">
             <mc:AlternateContent xmlns:mc="http://schemas.openxmlformats.org/markup-compatibility/2006">
               <mc:Choice xmlns:v="urn:schemas-microsoft-com:vml" Requires="v">
-                <p:oleObj spid="_x0000_s10243" name="Diapositive think-cell" r:id="rId8" imgW="270" imgH="270" progId="TCLayout.ActiveDocument.1">
+                <p:oleObj name="Diapositive think-cell" r:id="rId7" imgW="270" imgH="270" progId="TCLayout.ActiveDocument.1">
                   <p:embed/>
                 </p:oleObj>
               </mc:Choice>
               <mc:Fallback>
-                <p:oleObj name="Diapositive think-cell" r:id="rId8" imgW="270" imgH="270" progId="TCLayout.ActiveDocument.1">
+                <p:oleObj name="Diapositive think-cell" r:id="rId7" imgW="270" imgH="270" progId="TCLayout.ActiveDocument.1">
                   <p:embed/>
                   <p:pic>
                     <p:nvPicPr>
@@ -18581,7 +18581,7 @@
                       <p:nvPr/>
                     </p:nvPicPr>
                     <p:blipFill>
-                      <a:blip r:embed="rId9"/>
+                      <a:blip r:embed="rId8"/>
                       <a:stretch>
                         <a:fillRect/>
                       </a:stretch>
@@ -23548,243 +23548,64 @@
             </a:p>
           </p:txBody>
         </p:sp>
-        <p:grpSp>
-          <p:nvGrpSpPr>
-            <p:cNvPr id="22" name="Groupe 21">
+        <p:pic>
+          <p:nvPicPr>
+            <p:cNvPr id="117" name="Image 5">
               <a:extLst>
                 <a:ext uri="{FF2B5EF4-FFF2-40B4-BE49-F238E27FC236}">
-                  <a16:creationId xmlns:a16="http://schemas.microsoft.com/office/drawing/2014/main" id="{39D9F0DC-1F34-4671-B060-0C3931B82E9D}"/>
+                  <a16:creationId xmlns:a16="http://schemas.microsoft.com/office/drawing/2014/main" id="{CC8D5B8A-1FC3-4C96-9A08-8DE55A811D29}"/>
                 </a:ext>
               </a:extLst>
             </p:cNvPr>
-            <p:cNvGrpSpPr/>
+            <p:cNvPicPr>
+              <a:picLocks noChangeAspect="1" noChangeArrowheads="1"/>
+            </p:cNvPicPr>
             <p:nvPr/>
-          </p:nvGrpSpPr>
-          <p:grpSpPr>
-            <a:xfrm>
-              <a:off x="6473635" y="2198257"/>
-              <a:ext cx="1552385" cy="884148"/>
-              <a:chOff x="2196839" y="681078"/>
-              <a:chExt cx="1265533" cy="706142"/>
-            </a:xfrm>
-          </p:grpSpPr>
-          <p:pic>
-            <p:nvPicPr>
-              <p:cNvPr id="117" name="Image 5">
-                <a:extLst>
-                  <a:ext uri="{FF2B5EF4-FFF2-40B4-BE49-F238E27FC236}">
-                    <a16:creationId xmlns:a16="http://schemas.microsoft.com/office/drawing/2014/main" id="{CC8D5B8A-1FC3-4C96-9A08-8DE55A811D29}"/>
-                  </a:ext>
-                </a:extLst>
-              </p:cNvPr>
-              <p:cNvPicPr>
-                <a:picLocks noChangeAspect="1" noChangeArrowheads="1"/>
-              </p:cNvPicPr>
-              <p:nvPr/>
-            </p:nvPicPr>
-            <p:blipFill>
-              <a:blip r:embed="rId10" cstate="print">
-                <a:extLst>
-                  <a:ext uri="{28A0092B-C50C-407E-A947-70E740481C1C}">
-                    <a14:useLocalDpi xmlns:a14="http://schemas.microsoft.com/office/drawing/2010/main" val="0"/>
-                  </a:ext>
-                </a:extLst>
-              </a:blip>
-              <a:srcRect/>
-              <a:stretch>
-                <a:fillRect/>
-              </a:stretch>
-            </p:blipFill>
-            <p:spPr bwMode="auto">
-              <a:xfrm>
-                <a:off x="2196839" y="690633"/>
-                <a:ext cx="1265533" cy="696587"/>
-              </a:xfrm>
-              <a:prstGeom prst="rect">
-                <a:avLst/>
-              </a:prstGeom>
-              <a:noFill/>
-              <a:ln w="9525">
-                <a:solidFill>
-                  <a:schemeClr val="bg1">
-                    <a:lumMod val="65000"/>
-                  </a:schemeClr>
-                </a:solidFill>
-                <a:miter lim="800000"/>
-                <a:headEnd/>
-                <a:tailEnd/>
-              </a:ln>
-              <a:effectLst/>
+          </p:nvPicPr>
+          <p:blipFill>
+            <a:blip r:embed="rId10" cstate="print">
               <a:extLst>
-                <a:ext uri="{909E8E84-426E-40DD-AFC4-6F175D3DCCD1}">
-                  <a14:hiddenFill xmlns:a14="http://schemas.microsoft.com/office/drawing/2010/main">
-                    <a:solidFill>
-                      <a:srgbClr val="FFFFFF"/>
-                    </a:solidFill>
-                  </a14:hiddenFill>
+                <a:ext uri="{28A0092B-C50C-407E-A947-70E740481C1C}">
+                  <a14:useLocalDpi xmlns:a14="http://schemas.microsoft.com/office/drawing/2010/main" val="0"/>
                 </a:ext>
               </a:extLst>
-            </p:spPr>
-          </p:pic>
-          <p:grpSp>
-            <p:nvGrpSpPr>
-              <p:cNvPr id="21" name="Groupe 20">
-                <a:extLst>
-                  <a:ext uri="{FF2B5EF4-FFF2-40B4-BE49-F238E27FC236}">
-                    <a16:creationId xmlns:a16="http://schemas.microsoft.com/office/drawing/2014/main" id="{F97BE32B-9224-41A9-A81D-0BD4933073CB}"/>
-                  </a:ext>
-                </a:extLst>
-              </p:cNvPr>
-              <p:cNvGrpSpPr/>
-              <p:nvPr/>
-            </p:nvGrpSpPr>
-            <p:grpSpPr>
-              <a:xfrm>
-                <a:off x="2374022" y="681078"/>
-                <a:ext cx="267489" cy="68987"/>
-                <a:chOff x="2358544" y="602968"/>
-                <a:chExt cx="267489" cy="68987"/>
-              </a:xfrm>
-            </p:grpSpPr>
-            <p:sp>
-              <p:nvSpPr>
-                <p:cNvPr id="20" name="Rectangle 19">
-                  <a:extLst>
-                    <a:ext uri="{FF2B5EF4-FFF2-40B4-BE49-F238E27FC236}">
-                      <a16:creationId xmlns:a16="http://schemas.microsoft.com/office/drawing/2014/main" id="{504E7858-519F-497D-A1C9-759D97C848F6}"/>
-                    </a:ext>
-                  </a:extLst>
-                </p:cNvPr>
-                <p:cNvSpPr/>
-                <p:nvPr/>
-              </p:nvSpPr>
-              <p:spPr>
-                <a:xfrm>
-                  <a:off x="2358544" y="616207"/>
-                  <a:ext cx="267489" cy="46604"/>
-                </a:xfrm>
-                <a:prstGeom prst="rect">
-                  <a:avLst/>
-                </a:prstGeom>
-                <a:solidFill>
-                  <a:schemeClr val="bg1"/>
-                </a:solidFill>
-                <a:ln>
+            </a:blip>
+            <a:srcRect/>
+            <a:stretch>
+              <a:fillRect/>
+            </a:stretch>
+          </p:blipFill>
+          <p:spPr bwMode="auto">
+            <a:xfrm>
+              <a:off x="6473635" y="2210220"/>
+              <a:ext cx="1552385" cy="872184"/>
+            </a:xfrm>
+            <a:prstGeom prst="rect">
+              <a:avLst/>
+            </a:prstGeom>
+            <a:noFill/>
+            <a:ln w="9525">
+              <a:solidFill>
+                <a:schemeClr val="bg1">
+                  <a:lumMod val="65000"/>
+                </a:schemeClr>
+              </a:solidFill>
+              <a:miter lim="800000"/>
+              <a:headEnd/>
+              <a:tailEnd/>
+            </a:ln>
+            <a:effectLst/>
+            <a:extLst>
+              <a:ext uri="{909E8E84-426E-40DD-AFC4-6F175D3DCCD1}">
+                <a14:hiddenFill xmlns:a14="http://schemas.microsoft.com/office/drawing/2010/main">
                   <a:solidFill>
-                    <a:schemeClr val="bg1">
-                      <a:lumMod val="65000"/>
-                    </a:schemeClr>
+                    <a:srgbClr val="FFFFFF"/>
                   </a:solidFill>
-                </a:ln>
-                <a:effectLst/>
-              </p:spPr>
-              <p:style>
-                <a:lnRef idx="1">
-                  <a:schemeClr val="accent1"/>
-                </a:lnRef>
-                <a:fillRef idx="3">
-                  <a:schemeClr val="accent1"/>
-                </a:fillRef>
-                <a:effectRef idx="2">
-                  <a:schemeClr val="accent1"/>
-                </a:effectRef>
-                <a:fontRef idx="minor">
-                  <a:schemeClr val="lt1"/>
-                </a:fontRef>
-              </p:style>
-              <p:txBody>
-                <a:bodyPr rtlCol="0" anchor="ctr"/>
-                <a:lstStyle/>
-                <a:p>
-                  <a:pPr algn="ctr"/>
-                  <a:endParaRPr lang="en-US" sz="6272"/>
-                </a:p>
-              </p:txBody>
-            </p:sp>
-            <p:pic>
-              <p:nvPicPr>
-                <p:cNvPr id="172" name="Image 589">
-                  <a:extLst>
-                    <a:ext uri="{FF2B5EF4-FFF2-40B4-BE49-F238E27FC236}">
-                      <a16:creationId xmlns:a16="http://schemas.microsoft.com/office/drawing/2014/main" id="{DA68378C-DB9D-48B2-A6D2-53FEF4E69919}"/>
-                    </a:ext>
-                  </a:extLst>
-                </p:cNvPr>
-                <p:cNvPicPr>
-                  <a:picLocks noChangeAspect="1" noChangeArrowheads="1"/>
-                </p:cNvPicPr>
-                <p:nvPr/>
-              </p:nvPicPr>
-              <p:blipFill>
-                <a:blip r:embed="rId11">
-                  <a:extLst>
-                    <a:ext uri="{28A0092B-C50C-407E-A947-70E740481C1C}">
-                      <a14:useLocalDpi xmlns:a14="http://schemas.microsoft.com/office/drawing/2010/main" val="0"/>
-                    </a:ext>
-                  </a:extLst>
-                </a:blip>
-                <a:srcRect/>
-                <a:stretch>
-                  <a:fillRect/>
-                </a:stretch>
-              </p:blipFill>
-              <p:spPr bwMode="auto">
-                <a:xfrm>
-                  <a:off x="2367228" y="602968"/>
-                  <a:ext cx="258805" cy="68987"/>
-                </a:xfrm>
-                <a:prstGeom prst="rect">
-                  <a:avLst/>
-                </a:prstGeom>
-                <a:noFill/>
-                <a:ln>
-                  <a:solidFill>
-                    <a:schemeClr val="bg1">
-                      <a:lumMod val="65000"/>
-                    </a:schemeClr>
-                  </a:solidFill>
-                </a:ln>
-              </p:spPr>
-            </p:pic>
-          </p:grpSp>
-          <p:pic>
-            <p:nvPicPr>
-              <p:cNvPr id="173" name="Image 172">
-                <a:extLst>
-                  <a:ext uri="{FF2B5EF4-FFF2-40B4-BE49-F238E27FC236}">
-                    <a16:creationId xmlns:a16="http://schemas.microsoft.com/office/drawing/2014/main" id="{F347EDC3-B6BD-458E-BE78-A339C98400F5}"/>
-                  </a:ext>
-                </a:extLst>
-              </p:cNvPr>
-              <p:cNvPicPr>
-                <a:picLocks noChangeAspect="1"/>
-              </p:cNvPicPr>
-              <p:nvPr/>
-            </p:nvPicPr>
-            <p:blipFill>
-              <a:blip r:embed="rId12"/>
-              <a:stretch>
-                <a:fillRect/>
-              </a:stretch>
-            </p:blipFill>
-            <p:spPr>
-              <a:xfrm>
-                <a:off x="3322338" y="693448"/>
-                <a:ext cx="130144" cy="98823"/>
-              </a:xfrm>
-              <a:prstGeom prst="flowChartAlternateProcess">
-                <a:avLst/>
-              </a:prstGeom>
-              <a:ln>
-                <a:solidFill>
-                  <a:schemeClr val="bg1">
-                    <a:lumMod val="65000"/>
-                  </a:schemeClr>
-                </a:solidFill>
-              </a:ln>
-            </p:spPr>
-          </p:pic>
-        </p:grpSp>
+                </a14:hiddenFill>
+              </a:ext>
+            </a:extLst>
+          </p:spPr>
+        </p:pic>
         <p:sp>
           <p:nvSpPr>
             <p:cNvPr id="175" name="ZoneTexte 174">
@@ -25167,7 +24988,7 @@
             <p:nvPr/>
           </p:nvPicPr>
           <p:blipFill>
-            <a:blip r:embed="rId13"/>
+            <a:blip r:embed="rId11"/>
             <a:stretch>
               <a:fillRect/>
             </a:stretch>
@@ -25256,7 +25077,7 @@
             <p:nvPr/>
           </p:nvPicPr>
           <p:blipFill>
-            <a:blip r:embed="rId13"/>
+            <a:blip r:embed="rId11"/>
             <a:stretch>
               <a:fillRect/>
             </a:stretch>
@@ -25297,7 +25118,7 @@
             <p:nvPr/>
           </p:nvPicPr>
           <p:blipFill>
-            <a:blip r:embed="rId13"/>
+            <a:blip r:embed="rId11"/>
             <a:stretch>
               <a:fillRect/>
             </a:stretch>
@@ -25338,7 +25159,7 @@
             <p:nvPr/>
           </p:nvPicPr>
           <p:blipFill>
-            <a:blip r:embed="rId13"/>
+            <a:blip r:embed="rId11"/>
             <a:stretch>
               <a:fillRect/>
             </a:stretch>
@@ -27376,10 +27197,10 @@
             <p:nvPr/>
           </p:nvPicPr>
           <p:blipFill>
-            <a:blip r:embed="rId14">
+            <a:blip r:embed="rId12">
               <a:extLst>
                 <a:ext uri="{96DAC541-7B7A-43D3-8B79-37D633B846F1}">
-                  <asvg:svgBlip xmlns:asvg="http://schemas.microsoft.com/office/drawing/2016/SVG/main" r:embed="rId15"/>
+                  <asvg:svgBlip xmlns:asvg="http://schemas.microsoft.com/office/drawing/2016/SVG/main" r:embed="rId13"/>
                 </a:ext>
               </a:extLst>
             </a:blip>
@@ -27522,7 +27343,7 @@
             <p:nvPr/>
           </p:nvPicPr>
           <p:blipFill>
-            <a:blip r:embed="rId16"/>
+            <a:blip r:embed="rId14"/>
             <a:stretch>
               <a:fillRect/>
             </a:stretch>
@@ -29375,7 +29196,7 @@
             <p:nvPr/>
           </p:nvPicPr>
           <p:blipFill>
-            <a:blip r:embed="rId17" cstate="email">
+            <a:blip r:embed="rId15" cstate="email">
               <a:extLst>
                 <a:ext uri="{28A0092B-C50C-407E-A947-70E740481C1C}">
                   <a14:useLocalDpi xmlns:a14="http://schemas.microsoft.com/office/drawing/2010/main"/>
@@ -29411,10 +29232,10 @@
             <p:nvPr/>
           </p:nvPicPr>
           <p:blipFill>
-            <a:blip r:embed="rId18">
+            <a:blip r:embed="rId16">
               <a:extLst>
                 <a:ext uri="{96DAC541-7B7A-43D3-8B79-37D633B846F1}">
-                  <asvg:svgBlip xmlns:asvg="http://schemas.microsoft.com/office/drawing/2016/SVG/main" r:embed="rId19"/>
+                  <asvg:svgBlip xmlns:asvg="http://schemas.microsoft.com/office/drawing/2016/SVG/main" r:embed="rId17"/>
                 </a:ext>
               </a:extLst>
             </a:blip>
@@ -29952,7 +29773,7 @@
             <p:nvPr/>
           </p:nvPicPr>
           <p:blipFill>
-            <a:blip r:embed="rId20" cstate="print">
+            <a:blip r:embed="rId18" cstate="print">
               <a:extLst>
                 <a:ext uri="{28A0092B-C50C-407E-A947-70E740481C1C}">
                   <a14:useLocalDpi xmlns:a14="http://schemas.microsoft.com/office/drawing/2010/main" val="0"/>
@@ -29989,7 +29810,7 @@
           <p:nvPr/>
         </p:nvPicPr>
         <p:blipFill>
-          <a:blip r:embed="rId21"/>
+          <a:blip r:embed="rId19"/>
           <a:stretch>
             <a:fillRect/>
           </a:stretch>
@@ -30019,7 +29840,7 @@
           <p:nvPr/>
         </p:nvPicPr>
         <p:blipFill>
-          <a:blip r:embed="rId22"/>
+          <a:blip r:embed="rId20"/>
           <a:stretch>
             <a:fillRect/>
           </a:stretch>
@@ -33321,18 +33142,18 @@
 </file>
 
 <file path=customXml/item1.xml><?xml version="1.0" encoding="utf-8"?>
+<p:properties xmlns:p="http://schemas.microsoft.com/office/2006/metadata/properties" xmlns:xsi="http://www.w3.org/2001/XMLSchema-instance" xmlns:pc="http://schemas.microsoft.com/office/infopath/2007/PartnerControls">
+  <documentManagement/>
+</p:properties>
+</file>
+
+<file path=customXml/item2.xml><?xml version="1.0" encoding="utf-8"?>
 <?mso-contentType ?>
 <FormTemplates xmlns="http://schemas.microsoft.com/sharepoint/v3/contenttype/forms">
   <Display>DocumentLibraryForm</Display>
   <Edit>DocumentLibraryForm</Edit>
   <New>DocumentLibraryForm</New>
 </FormTemplates>
-</file>
-
-<file path=customXml/item2.xml><?xml version="1.0" encoding="utf-8"?>
-<p:properties xmlns:p="http://schemas.microsoft.com/office/2006/metadata/properties" xmlns:xsi="http://www.w3.org/2001/XMLSchema-instance" xmlns:pc="http://schemas.microsoft.com/office/infopath/2007/PartnerControls">
-  <documentManagement/>
-</p:properties>
 </file>
 
 <file path=customXml/item3.xml><?xml version="1.0" encoding="utf-8"?>
@@ -33545,14 +33366,6 @@
 </file>
 
 <file path=customXml/itemProps1.xml><?xml version="1.0" encoding="utf-8"?>
-<ds:datastoreItem xmlns:ds="http://schemas.openxmlformats.org/officeDocument/2006/customXml" ds:itemID="{7345BF31-44AE-4465-BECF-E43C8C381DB2}">
-  <ds:schemaRefs>
-    <ds:schemaRef ds:uri="http://schemas.microsoft.com/sharepoint/v3/contenttype/forms"/>
-  </ds:schemaRefs>
-</ds:datastoreItem>
-</file>
-
-<file path=customXml/itemProps2.xml><?xml version="1.0" encoding="utf-8"?>
 <ds:datastoreItem xmlns:ds="http://schemas.openxmlformats.org/officeDocument/2006/customXml" ds:itemID="{5FC97AAC-D16A-478F-95B1-E9944B8633B3}">
   <ds:schemaRefs>
     <ds:schemaRef ds:uri="e2e26994-5e48-4994-8c16-0b6f61c4bc8a"/>
@@ -33565,6 +33378,14 @@
     <ds:schemaRef ds:uri="http://schemas.microsoft.com/office/2006/metadata/properties"/>
     <ds:schemaRef ds:uri="http://purl.org/dc/terms/"/>
     <ds:schemaRef ds:uri="http://purl.org/dc/elements/1.1/"/>
+  </ds:schemaRefs>
+</ds:datastoreItem>
+</file>
+
+<file path=customXml/itemProps2.xml><?xml version="1.0" encoding="utf-8"?>
+<ds:datastoreItem xmlns:ds="http://schemas.openxmlformats.org/officeDocument/2006/customXml" ds:itemID="{7345BF31-44AE-4465-BECF-E43C8C381DB2}">
+  <ds:schemaRefs>
+    <ds:schemaRef ds:uri="http://schemas.microsoft.com/sharepoint/v3/contenttype/forms"/>
   </ds:schemaRefs>
 </ds:datastoreItem>
 </file>

</xml_diff>